<commit_message>
plot_cluster_performance, framework style on AUC
</commit_message>
<xml_diff>
--- a/flip_pictures.pptx
+++ b/flip_pictures.pptx
@@ -9,8 +9,6 @@
     <p:sldId id="257" r:id="rId4"/>
     <p:sldId id="258" r:id="rId5"/>
     <p:sldId id="259" r:id="rId6"/>
-    <p:sldId id="260" r:id="rId7"/>
-    <p:sldId id="261" r:id="rId8"/>
   </p:sldIdLst>
   <p:sldSz cx="10080625" cy="5670550"/>
   <p:notesSz cx="7772400" cy="10058400"/>
@@ -41,7 +39,7 @@
             <a:spLocks noGrp="1"/>
           </p:cNvSpPr>
           <p:nvPr>
-            <p:ph type="ftr" idx="2"/>
+            <p:ph type="ftr" idx="1"/>
           </p:nvPr>
         </p:nvSpPr>
         <p:spPr/>
@@ -61,14 +59,14 @@
             <a:spLocks noGrp="1"/>
           </p:cNvSpPr>
           <p:nvPr>
-            <p:ph type="sldNum" idx="3"/>
-          </p:nvPr>
-        </p:nvSpPr>
-        <p:spPr/>
-        <p:txBody>
-          <a:bodyPr/>
-          <a:p>
-            <a:fld id="{F35A72EE-33E1-4AC1-8858-DC582DBD527A}" type="slidenum">
+            <p:ph type="sldNum" idx="2"/>
+          </p:nvPr>
+        </p:nvSpPr>
+        <p:spPr/>
+        <p:txBody>
+          <a:bodyPr/>
+          <a:p>
+            <a:fld id="{E5279F94-F932-49B7-B502-D2A436844E3C}" type="slidenum">
               <a:t>&lt;#&gt;</a:t>
             </a:fld>
           </a:p>
@@ -81,7 +79,7 @@
             <a:spLocks noGrp="1"/>
           </p:cNvSpPr>
           <p:nvPr>
-            <p:ph type="dt" idx="1"/>
+            <p:ph type="dt" idx="3"/>
           </p:nvPr>
         </p:nvSpPr>
         <p:spPr/>
@@ -130,7 +128,7 @@
         <p:spPr>
           <a:xfrm>
             <a:off x="504000" y="226080"/>
-            <a:ext cx="9071640" cy="946440"/>
+            <a:ext cx="9071280" cy="946080"/>
           </a:xfrm>
           <a:prstGeom prst="rect">
             <a:avLst/>
@@ -170,7 +168,7 @@
         <p:spPr>
           <a:xfrm>
             <a:off x="504000" y="1326600"/>
-            <a:ext cx="9071640" cy="1568160"/>
+            <a:ext cx="9072000" cy="1568520"/>
           </a:xfrm>
           <a:prstGeom prst="rect">
             <a:avLst/>
@@ -212,8 +210,8 @@
         </p:nvSpPr>
         <p:spPr>
           <a:xfrm>
-            <a:off x="504000" y="3044160"/>
-            <a:ext cx="9071640" cy="1568160"/>
+            <a:off x="504000" y="3044520"/>
+            <a:ext cx="9072000" cy="1568520"/>
           </a:xfrm>
           <a:prstGeom prst="rect">
             <a:avLst/>
@@ -250,7 +248,7 @@
             <a:spLocks noGrp="1"/>
           </p:cNvSpPr>
           <p:nvPr>
-            <p:ph type="ftr" idx="2"/>
+            <p:ph type="ftr" idx="1"/>
           </p:nvPr>
         </p:nvSpPr>
         <p:spPr/>
@@ -270,14 +268,14 @@
             <a:spLocks noGrp="1"/>
           </p:cNvSpPr>
           <p:nvPr>
-            <p:ph type="sldNum" idx="3"/>
-          </p:nvPr>
-        </p:nvSpPr>
-        <p:spPr/>
-        <p:txBody>
-          <a:bodyPr/>
-          <a:p>
-            <a:fld id="{DFEB2B01-FF4C-47B2-8BC2-CEE4AD4552B1}" type="slidenum">
+            <p:ph type="sldNum" idx="2"/>
+          </p:nvPr>
+        </p:nvSpPr>
+        <p:spPr/>
+        <p:txBody>
+          <a:bodyPr/>
+          <a:p>
+            <a:fld id="{9060BC27-7AA1-47D6-A081-AC2454966C08}" type="slidenum">
               <a:t>&lt;#&gt;</a:t>
             </a:fld>
           </a:p>
@@ -290,7 +288,7 @@
             <a:spLocks noGrp="1"/>
           </p:cNvSpPr>
           <p:nvPr>
-            <p:ph type="dt" idx="1"/>
+            <p:ph type="dt" idx="3"/>
           </p:nvPr>
         </p:nvSpPr>
         <p:spPr/>
@@ -339,7 +337,7 @@
         <p:spPr>
           <a:xfrm>
             <a:off x="504000" y="226080"/>
-            <a:ext cx="9071640" cy="946440"/>
+            <a:ext cx="9071280" cy="946080"/>
           </a:xfrm>
           <a:prstGeom prst="rect">
             <a:avLst/>
@@ -379,7 +377,7 @@
         <p:spPr>
           <a:xfrm>
             <a:off x="504000" y="1326600"/>
-            <a:ext cx="4426920" cy="1568160"/>
+            <a:ext cx="4426920" cy="1568520"/>
           </a:xfrm>
           <a:prstGeom prst="rect">
             <a:avLst/>
@@ -422,7 +420,7 @@
         <p:spPr>
           <a:xfrm>
             <a:off x="5152680" y="1326600"/>
-            <a:ext cx="4426920" cy="1568160"/>
+            <a:ext cx="4426920" cy="1568520"/>
           </a:xfrm>
           <a:prstGeom prst="rect">
             <a:avLst/>
@@ -464,8 +462,8 @@
         </p:nvSpPr>
         <p:spPr>
           <a:xfrm>
-            <a:off x="504000" y="3044160"/>
-            <a:ext cx="4426920" cy="1568160"/>
+            <a:off x="504000" y="3044520"/>
+            <a:ext cx="4426920" cy="1568520"/>
           </a:xfrm>
           <a:prstGeom prst="rect">
             <a:avLst/>
@@ -507,8 +505,8 @@
         </p:nvSpPr>
         <p:spPr>
           <a:xfrm>
-            <a:off x="5152680" y="3044160"/>
-            <a:ext cx="4426920" cy="1568160"/>
+            <a:off x="5152680" y="3044520"/>
+            <a:ext cx="4426920" cy="1568520"/>
           </a:xfrm>
           <a:prstGeom prst="rect">
             <a:avLst/>
@@ -545,7 +543,7 @@
             <a:spLocks noGrp="1"/>
           </p:cNvSpPr>
           <p:nvPr>
-            <p:ph type="ftr" idx="2"/>
+            <p:ph type="ftr" idx="1"/>
           </p:nvPr>
         </p:nvSpPr>
         <p:spPr/>
@@ -565,14 +563,14 @@
             <a:spLocks noGrp="1"/>
           </p:cNvSpPr>
           <p:nvPr>
-            <p:ph type="sldNum" idx="3"/>
-          </p:nvPr>
-        </p:nvSpPr>
-        <p:spPr/>
-        <p:txBody>
-          <a:bodyPr/>
-          <a:p>
-            <a:fld id="{A8F7BEE1-87D9-4896-A525-E699214F12A1}" type="slidenum">
+            <p:ph type="sldNum" idx="2"/>
+          </p:nvPr>
+        </p:nvSpPr>
+        <p:spPr/>
+        <p:txBody>
+          <a:bodyPr/>
+          <a:p>
+            <a:fld id="{4DF7104A-B435-455E-8A5E-5E344D3D795A}" type="slidenum">
               <a:t>&lt;#&gt;</a:t>
             </a:fld>
           </a:p>
@@ -585,7 +583,7 @@
             <a:spLocks noGrp="1"/>
           </p:cNvSpPr>
           <p:nvPr>
-            <p:ph type="dt" idx="1"/>
+            <p:ph type="dt" idx="3"/>
           </p:nvPr>
         </p:nvSpPr>
         <p:spPr/>
@@ -634,7 +632,7 @@
         <p:spPr>
           <a:xfrm>
             <a:off x="504000" y="226080"/>
-            <a:ext cx="9071640" cy="946440"/>
+            <a:ext cx="9071280" cy="946080"/>
           </a:xfrm>
           <a:prstGeom prst="rect">
             <a:avLst/>
@@ -674,7 +672,7 @@
         <p:spPr>
           <a:xfrm>
             <a:off x="504000" y="1326600"/>
-            <a:ext cx="2920680" cy="1568160"/>
+            <a:ext cx="2921040" cy="1568520"/>
           </a:xfrm>
           <a:prstGeom prst="rect">
             <a:avLst/>
@@ -716,8 +714,8 @@
         </p:nvSpPr>
         <p:spPr>
           <a:xfrm>
-            <a:off x="3571200" y="1326600"/>
-            <a:ext cx="2920680" cy="1568160"/>
+            <a:off x="3571560" y="1326600"/>
+            <a:ext cx="2921040" cy="1568520"/>
           </a:xfrm>
           <a:prstGeom prst="rect">
             <a:avLst/>
@@ -759,8 +757,8 @@
         </p:nvSpPr>
         <p:spPr>
           <a:xfrm>
-            <a:off x="6638040" y="1326600"/>
-            <a:ext cx="2920680" cy="1568160"/>
+            <a:off x="6639120" y="1326600"/>
+            <a:ext cx="2921040" cy="1568520"/>
           </a:xfrm>
           <a:prstGeom prst="rect">
             <a:avLst/>
@@ -802,8 +800,8 @@
         </p:nvSpPr>
         <p:spPr>
           <a:xfrm>
-            <a:off x="504000" y="3044160"/>
-            <a:ext cx="2920680" cy="1568160"/>
+            <a:off x="504000" y="3044520"/>
+            <a:ext cx="2921040" cy="1568520"/>
           </a:xfrm>
           <a:prstGeom prst="rect">
             <a:avLst/>
@@ -845,8 +843,8 @@
         </p:nvSpPr>
         <p:spPr>
           <a:xfrm>
-            <a:off x="3571200" y="3044160"/>
-            <a:ext cx="2920680" cy="1568160"/>
+            <a:off x="3571560" y="3044520"/>
+            <a:ext cx="2921040" cy="1568520"/>
           </a:xfrm>
           <a:prstGeom prst="rect">
             <a:avLst/>
@@ -888,8 +886,8 @@
         </p:nvSpPr>
         <p:spPr>
           <a:xfrm>
-            <a:off x="6638040" y="3044160"/>
-            <a:ext cx="2920680" cy="1568160"/>
+            <a:off x="6639120" y="3044520"/>
+            <a:ext cx="2921040" cy="1568520"/>
           </a:xfrm>
           <a:prstGeom prst="rect">
             <a:avLst/>
@@ -926,7 +924,7 @@
             <a:spLocks noGrp="1"/>
           </p:cNvSpPr>
           <p:nvPr>
-            <p:ph type="ftr" idx="2"/>
+            <p:ph type="ftr" idx="1"/>
           </p:nvPr>
         </p:nvSpPr>
         <p:spPr/>
@@ -946,14 +944,14 @@
             <a:spLocks noGrp="1"/>
           </p:cNvSpPr>
           <p:nvPr>
-            <p:ph type="sldNum" idx="3"/>
-          </p:nvPr>
-        </p:nvSpPr>
-        <p:spPr/>
-        <p:txBody>
-          <a:bodyPr/>
-          <a:p>
-            <a:fld id="{B1666A45-6A32-4B8E-81BB-93F27DB0C83A}" type="slidenum">
+            <p:ph type="sldNum" idx="2"/>
+          </p:nvPr>
+        </p:nvSpPr>
+        <p:spPr/>
+        <p:txBody>
+          <a:bodyPr/>
+          <a:p>
+            <a:fld id="{8191FF9D-C1D7-4559-B5A1-58F653D46BD3}" type="slidenum">
               <a:t>&lt;#&gt;</a:t>
             </a:fld>
           </a:p>
@@ -966,7 +964,7 @@
             <a:spLocks noGrp="1"/>
           </p:cNvSpPr>
           <p:nvPr>
-            <p:ph type="dt" idx="1"/>
+            <p:ph type="dt" idx="3"/>
           </p:nvPr>
         </p:nvSpPr>
         <p:spPr/>
@@ -1015,7 +1013,7 @@
         <p:spPr>
           <a:xfrm>
             <a:off x="504000" y="226080"/>
-            <a:ext cx="9071640" cy="946440"/>
+            <a:ext cx="9071280" cy="946080"/>
           </a:xfrm>
           <a:prstGeom prst="rect">
             <a:avLst/>
@@ -1055,7 +1053,7 @@
         <p:spPr>
           <a:xfrm>
             <a:off x="504000" y="1326600"/>
-            <a:ext cx="9071640" cy="3288240"/>
+            <a:ext cx="9072000" cy="3288600"/>
           </a:xfrm>
           <a:prstGeom prst="rect">
             <a:avLst/>
@@ -1089,7 +1087,7 @@
             <a:spLocks noGrp="1"/>
           </p:cNvSpPr>
           <p:nvPr>
-            <p:ph type="ftr" idx="2"/>
+            <p:ph type="ftr" idx="1"/>
           </p:nvPr>
         </p:nvSpPr>
         <p:spPr/>
@@ -1109,14 +1107,14 @@
             <a:spLocks noGrp="1"/>
           </p:cNvSpPr>
           <p:nvPr>
-            <p:ph type="sldNum" idx="3"/>
-          </p:nvPr>
-        </p:nvSpPr>
-        <p:spPr/>
-        <p:txBody>
-          <a:bodyPr/>
-          <a:p>
-            <a:fld id="{9929F50A-5A3C-4B75-A8DC-87D7D521AD23}" type="slidenum">
+            <p:ph type="sldNum" idx="2"/>
+          </p:nvPr>
+        </p:nvSpPr>
+        <p:spPr/>
+        <p:txBody>
+          <a:bodyPr/>
+          <a:p>
+            <a:fld id="{08922A76-4FFD-4BF2-B5B5-AB5C322605F8}" type="slidenum">
               <a:t>&lt;#&gt;</a:t>
             </a:fld>
           </a:p>
@@ -1129,7 +1127,7 @@
             <a:spLocks noGrp="1"/>
           </p:cNvSpPr>
           <p:nvPr>
-            <p:ph type="dt" idx="1"/>
+            <p:ph type="dt" idx="3"/>
           </p:nvPr>
         </p:nvSpPr>
         <p:spPr/>
@@ -1178,7 +1176,7 @@
         <p:spPr>
           <a:xfrm>
             <a:off x="504000" y="226080"/>
-            <a:ext cx="9071640" cy="946440"/>
+            <a:ext cx="9071280" cy="946080"/>
           </a:xfrm>
           <a:prstGeom prst="rect">
             <a:avLst/>
@@ -1218,7 +1216,7 @@
         <p:spPr>
           <a:xfrm>
             <a:off x="504000" y="1326600"/>
-            <a:ext cx="9071640" cy="3288240"/>
+            <a:ext cx="9072000" cy="3288600"/>
           </a:xfrm>
           <a:prstGeom prst="rect">
             <a:avLst/>
@@ -1255,7 +1253,7 @@
             <a:spLocks noGrp="1"/>
           </p:cNvSpPr>
           <p:nvPr>
-            <p:ph type="ftr" idx="2"/>
+            <p:ph type="ftr" idx="1"/>
           </p:nvPr>
         </p:nvSpPr>
         <p:spPr/>
@@ -1275,14 +1273,14 @@
             <a:spLocks noGrp="1"/>
           </p:cNvSpPr>
           <p:nvPr>
-            <p:ph type="sldNum" idx="3"/>
-          </p:nvPr>
-        </p:nvSpPr>
-        <p:spPr/>
-        <p:txBody>
-          <a:bodyPr/>
-          <a:p>
-            <a:fld id="{F98ACC92-9F07-49C7-A9B5-C539461E5E27}" type="slidenum">
+            <p:ph type="sldNum" idx="2"/>
+          </p:nvPr>
+        </p:nvSpPr>
+        <p:spPr/>
+        <p:txBody>
+          <a:bodyPr/>
+          <a:p>
+            <a:fld id="{29276ED1-91A0-48A4-969D-98C20BCAC684}" type="slidenum">
               <a:t>&lt;#&gt;</a:t>
             </a:fld>
           </a:p>
@@ -1295,7 +1293,7 @@
             <a:spLocks noGrp="1"/>
           </p:cNvSpPr>
           <p:nvPr>
-            <p:ph type="dt" idx="1"/>
+            <p:ph type="dt" idx="3"/>
           </p:nvPr>
         </p:nvSpPr>
         <p:spPr/>
@@ -1344,7 +1342,7 @@
         <p:spPr>
           <a:xfrm>
             <a:off x="504000" y="226080"/>
-            <a:ext cx="9071640" cy="946440"/>
+            <a:ext cx="9071280" cy="946080"/>
           </a:xfrm>
           <a:prstGeom prst="rect">
             <a:avLst/>
@@ -1384,7 +1382,7 @@
         <p:spPr>
           <a:xfrm>
             <a:off x="504000" y="1326600"/>
-            <a:ext cx="4426920" cy="3288240"/>
+            <a:ext cx="4426920" cy="3288600"/>
           </a:xfrm>
           <a:prstGeom prst="rect">
             <a:avLst/>
@@ -1427,7 +1425,7 @@
         <p:spPr>
           <a:xfrm>
             <a:off x="5152680" y="1326600"/>
-            <a:ext cx="4426920" cy="3288240"/>
+            <a:ext cx="4426920" cy="3288600"/>
           </a:xfrm>
           <a:prstGeom prst="rect">
             <a:avLst/>
@@ -1464,7 +1462,7 @@
             <a:spLocks noGrp="1"/>
           </p:cNvSpPr>
           <p:nvPr>
-            <p:ph type="ftr" idx="2"/>
+            <p:ph type="ftr" idx="1"/>
           </p:nvPr>
         </p:nvSpPr>
         <p:spPr/>
@@ -1484,14 +1482,14 @@
             <a:spLocks noGrp="1"/>
           </p:cNvSpPr>
           <p:nvPr>
-            <p:ph type="sldNum" idx="3"/>
-          </p:nvPr>
-        </p:nvSpPr>
-        <p:spPr/>
-        <p:txBody>
-          <a:bodyPr/>
-          <a:p>
-            <a:fld id="{43DCD97B-7646-4503-BAC0-F65010F05069}" type="slidenum">
+            <p:ph type="sldNum" idx="2"/>
+          </p:nvPr>
+        </p:nvSpPr>
+        <p:spPr/>
+        <p:txBody>
+          <a:bodyPr/>
+          <a:p>
+            <a:fld id="{48F26AB0-B98D-408B-8722-C3766CDA5F43}" type="slidenum">
               <a:t>&lt;#&gt;</a:t>
             </a:fld>
           </a:p>
@@ -1504,7 +1502,7 @@
             <a:spLocks noGrp="1"/>
           </p:cNvSpPr>
           <p:nvPr>
-            <p:ph type="dt" idx="1"/>
+            <p:ph type="dt" idx="3"/>
           </p:nvPr>
         </p:nvSpPr>
         <p:spPr/>
@@ -1553,7 +1551,7 @@
         <p:spPr>
           <a:xfrm>
             <a:off x="504000" y="226080"/>
-            <a:ext cx="9071640" cy="946440"/>
+            <a:ext cx="9071280" cy="946080"/>
           </a:xfrm>
           <a:prstGeom prst="rect">
             <a:avLst/>
@@ -1587,7 +1585,7 @@
             <a:spLocks noGrp="1"/>
           </p:cNvSpPr>
           <p:nvPr>
-            <p:ph type="ftr" idx="2"/>
+            <p:ph type="ftr" idx="1"/>
           </p:nvPr>
         </p:nvSpPr>
         <p:spPr/>
@@ -1607,14 +1605,14 @@
             <a:spLocks noGrp="1"/>
           </p:cNvSpPr>
           <p:nvPr>
-            <p:ph type="sldNum" idx="3"/>
-          </p:nvPr>
-        </p:nvSpPr>
-        <p:spPr/>
-        <p:txBody>
-          <a:bodyPr/>
-          <a:p>
-            <a:fld id="{0D28C895-DEAC-4DC5-9483-20ABCF90DAB1}" type="slidenum">
+            <p:ph type="sldNum" idx="2"/>
+          </p:nvPr>
+        </p:nvSpPr>
+        <p:spPr/>
+        <p:txBody>
+          <a:bodyPr/>
+          <a:p>
+            <a:fld id="{E9251E4D-DBB4-48E3-8D54-7F7C878BD916}" type="slidenum">
               <a:t>&lt;#&gt;</a:t>
             </a:fld>
           </a:p>
@@ -1627,7 +1625,7 @@
             <a:spLocks noGrp="1"/>
           </p:cNvSpPr>
           <p:nvPr>
-            <p:ph type="dt" idx="1"/>
+            <p:ph type="dt" idx="3"/>
           </p:nvPr>
         </p:nvSpPr>
         <p:spPr/>
@@ -1676,7 +1674,7 @@
         <p:spPr>
           <a:xfrm>
             <a:off x="504000" y="226080"/>
-            <a:ext cx="9071640" cy="4388400"/>
+            <a:ext cx="9071280" cy="4386600"/>
           </a:xfrm>
           <a:prstGeom prst="rect">
             <a:avLst/>
@@ -1708,7 +1706,7 @@
             <a:spLocks noGrp="1"/>
           </p:cNvSpPr>
           <p:nvPr>
-            <p:ph type="ftr" idx="2"/>
+            <p:ph type="ftr" idx="1"/>
           </p:nvPr>
         </p:nvSpPr>
         <p:spPr/>
@@ -1728,14 +1726,14 @@
             <a:spLocks noGrp="1"/>
           </p:cNvSpPr>
           <p:nvPr>
-            <p:ph type="sldNum" idx="3"/>
-          </p:nvPr>
-        </p:nvSpPr>
-        <p:spPr/>
-        <p:txBody>
-          <a:bodyPr/>
-          <a:p>
-            <a:fld id="{4E263E9E-3A05-4168-B320-FCAFA71136E8}" type="slidenum">
+            <p:ph type="sldNum" idx="2"/>
+          </p:nvPr>
+        </p:nvSpPr>
+        <p:spPr/>
+        <p:txBody>
+          <a:bodyPr/>
+          <a:p>
+            <a:fld id="{2189AD6C-7B6B-4ABF-8B6D-899E46738C8B}" type="slidenum">
               <a:t>&lt;#&gt;</a:t>
             </a:fld>
           </a:p>
@@ -1748,7 +1746,7 @@
             <a:spLocks noGrp="1"/>
           </p:cNvSpPr>
           <p:nvPr>
-            <p:ph type="dt" idx="1"/>
+            <p:ph type="dt" idx="3"/>
           </p:nvPr>
         </p:nvSpPr>
         <p:spPr/>
@@ -1797,7 +1795,7 @@
         <p:spPr>
           <a:xfrm>
             <a:off x="504000" y="226080"/>
-            <a:ext cx="9071640" cy="946440"/>
+            <a:ext cx="9071280" cy="946080"/>
           </a:xfrm>
           <a:prstGeom prst="rect">
             <a:avLst/>
@@ -1837,7 +1835,7 @@
         <p:spPr>
           <a:xfrm>
             <a:off x="504000" y="1326600"/>
-            <a:ext cx="4426920" cy="1568160"/>
+            <a:ext cx="4426920" cy="1568520"/>
           </a:xfrm>
           <a:prstGeom prst="rect">
             <a:avLst/>
@@ -1880,7 +1878,7 @@
         <p:spPr>
           <a:xfrm>
             <a:off x="5152680" y="1326600"/>
-            <a:ext cx="4426920" cy="3288240"/>
+            <a:ext cx="4426920" cy="3288600"/>
           </a:xfrm>
           <a:prstGeom prst="rect">
             <a:avLst/>
@@ -1922,8 +1920,8 @@
         </p:nvSpPr>
         <p:spPr>
           <a:xfrm>
-            <a:off x="504000" y="3044160"/>
-            <a:ext cx="4426920" cy="1568160"/>
+            <a:off x="504000" y="3044520"/>
+            <a:ext cx="4426920" cy="1568520"/>
           </a:xfrm>
           <a:prstGeom prst="rect">
             <a:avLst/>
@@ -1960,7 +1958,7 @@
             <a:spLocks noGrp="1"/>
           </p:cNvSpPr>
           <p:nvPr>
-            <p:ph type="ftr" idx="2"/>
+            <p:ph type="ftr" idx="1"/>
           </p:nvPr>
         </p:nvSpPr>
         <p:spPr/>
@@ -1980,14 +1978,14 @@
             <a:spLocks noGrp="1"/>
           </p:cNvSpPr>
           <p:nvPr>
-            <p:ph type="sldNum" idx="3"/>
-          </p:nvPr>
-        </p:nvSpPr>
-        <p:spPr/>
-        <p:txBody>
-          <a:bodyPr/>
-          <a:p>
-            <a:fld id="{6C3062CF-3E37-452B-BC8D-FE2D246B851B}" type="slidenum">
+            <p:ph type="sldNum" idx="2"/>
+          </p:nvPr>
+        </p:nvSpPr>
+        <p:spPr/>
+        <p:txBody>
+          <a:bodyPr/>
+          <a:p>
+            <a:fld id="{2A5EBF2D-ABBD-448A-85D2-D6A5ACC91AC9}" type="slidenum">
               <a:t>&lt;#&gt;</a:t>
             </a:fld>
           </a:p>
@@ -2000,7 +1998,7 @@
             <a:spLocks noGrp="1"/>
           </p:cNvSpPr>
           <p:nvPr>
-            <p:ph type="dt" idx="1"/>
+            <p:ph type="dt" idx="3"/>
           </p:nvPr>
         </p:nvSpPr>
         <p:spPr/>
@@ -2049,7 +2047,7 @@
         <p:spPr>
           <a:xfrm>
             <a:off x="504000" y="226080"/>
-            <a:ext cx="9071640" cy="946440"/>
+            <a:ext cx="9071280" cy="946080"/>
           </a:xfrm>
           <a:prstGeom prst="rect">
             <a:avLst/>
@@ -2089,7 +2087,7 @@
         <p:spPr>
           <a:xfrm>
             <a:off x="504000" y="1326600"/>
-            <a:ext cx="4426920" cy="3288240"/>
+            <a:ext cx="4426920" cy="3288600"/>
           </a:xfrm>
           <a:prstGeom prst="rect">
             <a:avLst/>
@@ -2132,7 +2130,7 @@
         <p:spPr>
           <a:xfrm>
             <a:off x="5152680" y="1326600"/>
-            <a:ext cx="4426920" cy="1568160"/>
+            <a:ext cx="4426920" cy="1568520"/>
           </a:xfrm>
           <a:prstGeom prst="rect">
             <a:avLst/>
@@ -2174,8 +2172,8 @@
         </p:nvSpPr>
         <p:spPr>
           <a:xfrm>
-            <a:off x="5152680" y="3044160"/>
-            <a:ext cx="4426920" cy="1568160"/>
+            <a:off x="5152680" y="3044520"/>
+            <a:ext cx="4426920" cy="1568520"/>
           </a:xfrm>
           <a:prstGeom prst="rect">
             <a:avLst/>
@@ -2212,7 +2210,7 @@
             <a:spLocks noGrp="1"/>
           </p:cNvSpPr>
           <p:nvPr>
-            <p:ph type="ftr" idx="2"/>
+            <p:ph type="ftr" idx="1"/>
           </p:nvPr>
         </p:nvSpPr>
         <p:spPr/>
@@ -2232,14 +2230,14 @@
             <a:spLocks noGrp="1"/>
           </p:cNvSpPr>
           <p:nvPr>
-            <p:ph type="sldNum" idx="3"/>
-          </p:nvPr>
-        </p:nvSpPr>
-        <p:spPr/>
-        <p:txBody>
-          <a:bodyPr/>
-          <a:p>
-            <a:fld id="{EBEC3857-D2A6-40CD-9513-C5A232BC377D}" type="slidenum">
+            <p:ph type="sldNum" idx="2"/>
+          </p:nvPr>
+        </p:nvSpPr>
+        <p:spPr/>
+        <p:txBody>
+          <a:bodyPr/>
+          <a:p>
+            <a:fld id="{B07172F2-BE45-4804-BD8D-13D4D12CD294}" type="slidenum">
               <a:t>&lt;#&gt;</a:t>
             </a:fld>
           </a:p>
@@ -2252,7 +2250,7 @@
             <a:spLocks noGrp="1"/>
           </p:cNvSpPr>
           <p:nvPr>
-            <p:ph type="dt" idx="1"/>
+            <p:ph type="dt" idx="3"/>
           </p:nvPr>
         </p:nvSpPr>
         <p:spPr/>
@@ -2301,7 +2299,7 @@
         <p:spPr>
           <a:xfrm>
             <a:off x="504000" y="226080"/>
-            <a:ext cx="9071640" cy="946440"/>
+            <a:ext cx="9071280" cy="946080"/>
           </a:xfrm>
           <a:prstGeom prst="rect">
             <a:avLst/>
@@ -2341,7 +2339,7 @@
         <p:spPr>
           <a:xfrm>
             <a:off x="504000" y="1326600"/>
-            <a:ext cx="4426920" cy="1568160"/>
+            <a:ext cx="4426920" cy="1568520"/>
           </a:xfrm>
           <a:prstGeom prst="rect">
             <a:avLst/>
@@ -2384,7 +2382,7 @@
         <p:spPr>
           <a:xfrm>
             <a:off x="5152680" y="1326600"/>
-            <a:ext cx="4426920" cy="1568160"/>
+            <a:ext cx="4426920" cy="1568520"/>
           </a:xfrm>
           <a:prstGeom prst="rect">
             <a:avLst/>
@@ -2426,8 +2424,8 @@
         </p:nvSpPr>
         <p:spPr>
           <a:xfrm>
-            <a:off x="504000" y="3044160"/>
-            <a:ext cx="9071640" cy="1568160"/>
+            <a:off x="504000" y="3044520"/>
+            <a:ext cx="9072000" cy="1568520"/>
           </a:xfrm>
           <a:prstGeom prst="rect">
             <a:avLst/>
@@ -2464,7 +2462,7 @@
             <a:spLocks noGrp="1"/>
           </p:cNvSpPr>
           <p:nvPr>
-            <p:ph type="ftr" idx="2"/>
+            <p:ph type="ftr" idx="1"/>
           </p:nvPr>
         </p:nvSpPr>
         <p:spPr/>
@@ -2484,14 +2482,14 @@
             <a:spLocks noGrp="1"/>
           </p:cNvSpPr>
           <p:nvPr>
-            <p:ph type="sldNum" idx="3"/>
-          </p:nvPr>
-        </p:nvSpPr>
-        <p:spPr/>
-        <p:txBody>
-          <a:bodyPr/>
-          <a:p>
-            <a:fld id="{01AE818A-4A72-4976-BA05-C551A746B80C}" type="slidenum">
+            <p:ph type="sldNum" idx="2"/>
+          </p:nvPr>
+        </p:nvSpPr>
+        <p:spPr/>
+        <p:txBody>
+          <a:bodyPr/>
+          <a:p>
+            <a:fld id="{3D16FCB1-39A9-4D52-88E7-A48EAB65713D}" type="slidenum">
               <a:t>&lt;#&gt;</a:t>
             </a:fld>
           </a:p>
@@ -2504,7 +2502,7 @@
             <a:spLocks noGrp="1"/>
           </p:cNvSpPr>
           <p:nvPr>
-            <p:ph type="dt" idx="1"/>
+            <p:ph type="dt" idx="3"/>
           </p:nvPr>
         </p:nvSpPr>
         <p:spPr/>
@@ -2553,7 +2551,7 @@
         <p:spPr>
           <a:xfrm>
             <a:off x="504000" y="226080"/>
-            <a:ext cx="9071640" cy="946440"/>
+            <a:ext cx="9071280" cy="946080"/>
           </a:xfrm>
           <a:prstGeom prst="rect">
             <a:avLst/>
@@ -2568,11 +2566,11 @@
             <a:noAutofit/>
           </a:bodyPr>
           <a:p>
-            <a:pPr indent="0" algn="ctr">
+            <a:pPr indent="0">
               <a:buNone/>
             </a:pPr>
             <a:r>
-              <a:rPr b="0" lang="en-US" sz="4400" spc="-1" strike="noStrike">
+              <a:rPr b="0" lang="en-US" sz="1800" spc="-1" strike="noStrike">
                 <a:solidFill>
                   <a:srgbClr val="000000"/>
                 </a:solidFill>
@@ -2580,7 +2578,7 @@
               </a:rPr>
               <a:t>Click to edit the title text format</a:t>
             </a:r>
-            <a:endParaRPr b="0" lang="en-US" sz="4400" spc="-1" strike="noStrike">
+            <a:endParaRPr b="0" lang="en-US" sz="1800" spc="-1" strike="noStrike">
               <a:solidFill>
                 <a:srgbClr val="000000"/>
               </a:solidFill>
@@ -2596,13 +2594,217 @@
             <a:spLocks noGrp="1"/>
           </p:cNvSpPr>
           <p:nvPr>
+            <p:ph type="ftr" idx="1"/>
+          </p:nvPr>
+        </p:nvSpPr>
+        <p:spPr>
+          <a:xfrm>
+            <a:off x="3447360" y="5165280"/>
+            <a:ext cx="3194640" cy="390240"/>
+          </a:xfrm>
+          <a:prstGeom prst="rect">
+            <a:avLst/>
+          </a:prstGeom>
+          <a:noFill/>
+          <a:ln w="0">
+            <a:noFill/>
+          </a:ln>
+        </p:spPr>
+        <p:txBody>
+          <a:bodyPr lIns="0" rIns="0" tIns="0" bIns="0" anchor="t">
+            <a:noAutofit/>
+          </a:bodyPr>
+          <a:lstStyle>
+            <a:lvl1pPr indent="0" algn="ctr">
+              <a:lnSpc>
+                <a:spcPct val="100000"/>
+              </a:lnSpc>
+              <a:buNone/>
+              <a:tabLst>
+                <a:tab algn="l" pos="0"/>
+              </a:tabLst>
+              <a:defRPr b="0" lang="en-US" sz="1400" spc="-1" strike="noStrike">
+                <a:solidFill>
+                  <a:srgbClr val="000000"/>
+                </a:solidFill>
+                <a:latin typeface="Times New Roman"/>
+              </a:defRPr>
+            </a:lvl1pPr>
+          </a:lstStyle>
+          <a:p>
+            <a:pPr indent="0" algn="ctr">
+              <a:lnSpc>
+                <a:spcPct val="100000"/>
+              </a:lnSpc>
+              <a:buNone/>
+              <a:tabLst>
+                <a:tab algn="l" pos="0"/>
+              </a:tabLst>
+            </a:pPr>
+            <a:r>
+              <a:rPr b="0" lang="en-US" sz="1400" spc="-1" strike="noStrike">
+                <a:solidFill>
+                  <a:srgbClr val="000000"/>
+                </a:solidFill>
+                <a:latin typeface="Times New Roman"/>
+              </a:rPr>
+              <a:t>&lt;footer&gt;</a:t>
+            </a:r>
+            <a:endParaRPr b="0" lang="en-US" sz="1400" spc="-1" strike="noStrike">
+              <a:solidFill>
+                <a:srgbClr val="000000"/>
+              </a:solidFill>
+              <a:latin typeface="Times New Roman"/>
+            </a:endParaRPr>
+          </a:p>
+        </p:txBody>
+      </p:sp>
+      <p:sp>
+        <p:nvSpPr>
+          <p:cNvPr id="2" name="PlaceHolder 3"/>
+          <p:cNvSpPr>
+            <a:spLocks noGrp="1"/>
+          </p:cNvSpPr>
+          <p:nvPr>
+            <p:ph type="sldNum" idx="2"/>
+          </p:nvPr>
+        </p:nvSpPr>
+        <p:spPr>
+          <a:xfrm>
+            <a:off x="7227360" y="5165280"/>
+            <a:ext cx="2347920" cy="390240"/>
+          </a:xfrm>
+          <a:prstGeom prst="rect">
+            <a:avLst/>
+          </a:prstGeom>
+          <a:noFill/>
+          <a:ln w="0">
+            <a:noFill/>
+          </a:ln>
+        </p:spPr>
+        <p:txBody>
+          <a:bodyPr lIns="0" rIns="0" tIns="0" bIns="0" anchor="t">
+            <a:noAutofit/>
+          </a:bodyPr>
+          <a:lstStyle>
+            <a:lvl1pPr indent="0" algn="r">
+              <a:lnSpc>
+                <a:spcPct val="100000"/>
+              </a:lnSpc>
+              <a:buNone/>
+              <a:tabLst>
+                <a:tab algn="l" pos="0"/>
+              </a:tabLst>
+              <a:defRPr b="0" lang="en-US" sz="1400" spc="-1" strike="noStrike">
+                <a:solidFill>
+                  <a:srgbClr val="000000"/>
+                </a:solidFill>
+                <a:latin typeface="Times New Roman"/>
+              </a:defRPr>
+            </a:lvl1pPr>
+          </a:lstStyle>
+          <a:p>
+            <a:pPr indent="0" algn="r">
+              <a:lnSpc>
+                <a:spcPct val="100000"/>
+              </a:lnSpc>
+              <a:buNone/>
+              <a:tabLst>
+                <a:tab algn="l" pos="0"/>
+              </a:tabLst>
+            </a:pPr>
+            <a:fld id="{7FAE0923-B1FD-450A-981E-E0C5084B2299}" type="slidenum">
+              <a:rPr b="0" lang="en-US" sz="1400" spc="-1" strike="noStrike">
+                <a:solidFill>
+                  <a:srgbClr val="000000"/>
+                </a:solidFill>
+                <a:latin typeface="Times New Roman"/>
+              </a:rPr>
+              <a:t>&lt;number&gt;</a:t>
+            </a:fld>
+            <a:endParaRPr b="0" lang="en-US" sz="1400" spc="-1" strike="noStrike">
+              <a:solidFill>
+                <a:srgbClr val="000000"/>
+              </a:solidFill>
+              <a:latin typeface="Times New Roman"/>
+            </a:endParaRPr>
+          </a:p>
+        </p:txBody>
+      </p:sp>
+      <p:sp>
+        <p:nvSpPr>
+          <p:cNvPr id="3" name="PlaceHolder 4"/>
+          <p:cNvSpPr>
+            <a:spLocks noGrp="1"/>
+          </p:cNvSpPr>
+          <p:nvPr>
+            <p:ph type="dt" idx="3"/>
+          </p:nvPr>
+        </p:nvSpPr>
+        <p:spPr>
+          <a:xfrm>
+            <a:off x="504000" y="5165280"/>
+            <a:ext cx="2347920" cy="390240"/>
+          </a:xfrm>
+          <a:prstGeom prst="rect">
+            <a:avLst/>
+          </a:prstGeom>
+          <a:noFill/>
+          <a:ln w="0">
+            <a:noFill/>
+          </a:ln>
+        </p:spPr>
+        <p:txBody>
+          <a:bodyPr lIns="0" rIns="0" tIns="0" bIns="0" anchor="t">
+            <a:noAutofit/>
+          </a:bodyPr>
+          <a:lstStyle>
+            <a:lvl1pPr indent="0">
+              <a:buNone/>
+              <a:defRPr b="0" lang="en-US" sz="1400" spc="-1" strike="noStrike">
+                <a:solidFill>
+                  <a:srgbClr val="000000"/>
+                </a:solidFill>
+                <a:latin typeface="Times New Roman"/>
+              </a:defRPr>
+            </a:lvl1pPr>
+          </a:lstStyle>
+          <a:p>
+            <a:pPr indent="0">
+              <a:buNone/>
+            </a:pPr>
+            <a:r>
+              <a:rPr b="0" lang="en-US" sz="1400" spc="-1" strike="noStrike">
+                <a:solidFill>
+                  <a:srgbClr val="000000"/>
+                </a:solidFill>
+                <a:latin typeface="Times New Roman"/>
+              </a:rPr>
+              <a:t>&lt;date/time&gt;</a:t>
+            </a:r>
+            <a:endParaRPr b="0" lang="en-US" sz="1400" spc="-1" strike="noStrike">
+              <a:solidFill>
+                <a:srgbClr val="000000"/>
+              </a:solidFill>
+              <a:latin typeface="Times New Roman"/>
+            </a:endParaRPr>
+          </a:p>
+        </p:txBody>
+      </p:sp>
+      <p:sp>
+        <p:nvSpPr>
+          <p:cNvPr id="4" name="PlaceHolder 5"/>
+          <p:cNvSpPr>
+            <a:spLocks noGrp="1"/>
+          </p:cNvSpPr>
+          <p:nvPr>
             <p:ph type="body"/>
           </p:nvPr>
         </p:nvSpPr>
         <p:spPr>
           <a:xfrm>
             <a:off x="504000" y="1326600"/>
-            <a:ext cx="9071640" cy="3288240"/>
+            <a:ext cx="9072000" cy="3288600"/>
           </a:xfrm>
           <a:prstGeom prst="rect">
             <a:avLst/>
@@ -2810,186 +3012,6 @@
                 <a:srgbClr val="000000"/>
               </a:solidFill>
               <a:latin typeface="Arial"/>
-            </a:endParaRPr>
-          </a:p>
-        </p:txBody>
-      </p:sp>
-      <p:sp>
-        <p:nvSpPr>
-          <p:cNvPr id="2" name="PlaceHolder 3"/>
-          <p:cNvSpPr>
-            <a:spLocks noGrp="1"/>
-          </p:cNvSpPr>
-          <p:nvPr>
-            <p:ph type="dt" idx="1"/>
-          </p:nvPr>
-        </p:nvSpPr>
-        <p:spPr>
-          <a:xfrm>
-            <a:off x="504000" y="5165280"/>
-            <a:ext cx="2348280" cy="390600"/>
-          </a:xfrm>
-          <a:prstGeom prst="rect">
-            <a:avLst/>
-          </a:prstGeom>
-          <a:noFill/>
-          <a:ln w="0">
-            <a:noFill/>
-          </a:ln>
-        </p:spPr>
-        <p:txBody>
-          <a:bodyPr lIns="0" rIns="0" tIns="0" bIns="0" anchor="t">
-            <a:noAutofit/>
-          </a:bodyPr>
-          <a:lstStyle>
-            <a:lvl1pPr indent="0">
-              <a:buNone/>
-              <a:defRPr b="0" lang="en-US" sz="1400" spc="-1" strike="noStrike">
-                <a:solidFill>
-                  <a:srgbClr val="000000"/>
-                </a:solidFill>
-                <a:latin typeface="Times New Roman"/>
-              </a:defRPr>
-            </a:lvl1pPr>
-          </a:lstStyle>
-          <a:p>
-            <a:pPr indent="0">
-              <a:buNone/>
-            </a:pPr>
-            <a:r>
-              <a:rPr b="0" lang="en-US" sz="1400" spc="-1" strike="noStrike">
-                <a:solidFill>
-                  <a:srgbClr val="000000"/>
-                </a:solidFill>
-                <a:latin typeface="Times New Roman"/>
-              </a:rPr>
-              <a:t>&lt;date/time&gt;</a:t>
-            </a:r>
-            <a:endParaRPr b="0" lang="en-US" sz="1400" spc="-1" strike="noStrike">
-              <a:solidFill>
-                <a:srgbClr val="000000"/>
-              </a:solidFill>
-              <a:latin typeface="Times New Roman"/>
-            </a:endParaRPr>
-          </a:p>
-        </p:txBody>
-      </p:sp>
-      <p:sp>
-        <p:nvSpPr>
-          <p:cNvPr id="3" name="PlaceHolder 4"/>
-          <p:cNvSpPr>
-            <a:spLocks noGrp="1"/>
-          </p:cNvSpPr>
-          <p:nvPr>
-            <p:ph type="ftr" idx="2"/>
-          </p:nvPr>
-        </p:nvSpPr>
-        <p:spPr>
-          <a:xfrm>
-            <a:off x="3447360" y="5165280"/>
-            <a:ext cx="3195000" cy="390600"/>
-          </a:xfrm>
-          <a:prstGeom prst="rect">
-            <a:avLst/>
-          </a:prstGeom>
-          <a:noFill/>
-          <a:ln w="0">
-            <a:noFill/>
-          </a:ln>
-        </p:spPr>
-        <p:txBody>
-          <a:bodyPr lIns="0" rIns="0" tIns="0" bIns="0" anchor="t">
-            <a:noAutofit/>
-          </a:bodyPr>
-          <a:lstStyle>
-            <a:lvl1pPr indent="0" algn="ctr">
-              <a:buNone/>
-              <a:defRPr b="0" lang="en-US" sz="1400" spc="-1" strike="noStrike">
-                <a:solidFill>
-                  <a:srgbClr val="000000"/>
-                </a:solidFill>
-                <a:latin typeface="Times New Roman"/>
-              </a:defRPr>
-            </a:lvl1pPr>
-          </a:lstStyle>
-          <a:p>
-            <a:pPr indent="0" algn="ctr">
-              <a:buNone/>
-            </a:pPr>
-            <a:r>
-              <a:rPr b="0" lang="en-US" sz="1400" spc="-1" strike="noStrike">
-                <a:solidFill>
-                  <a:srgbClr val="000000"/>
-                </a:solidFill>
-                <a:latin typeface="Times New Roman"/>
-              </a:rPr>
-              <a:t>&lt;footer&gt;</a:t>
-            </a:r>
-            <a:endParaRPr b="0" lang="en-US" sz="1400" spc="-1" strike="noStrike">
-              <a:solidFill>
-                <a:srgbClr val="000000"/>
-              </a:solidFill>
-              <a:latin typeface="Times New Roman"/>
-            </a:endParaRPr>
-          </a:p>
-        </p:txBody>
-      </p:sp>
-      <p:sp>
-        <p:nvSpPr>
-          <p:cNvPr id="4" name="PlaceHolder 5"/>
-          <p:cNvSpPr>
-            <a:spLocks noGrp="1"/>
-          </p:cNvSpPr>
-          <p:nvPr>
-            <p:ph type="sldNum" idx="3"/>
-          </p:nvPr>
-        </p:nvSpPr>
-        <p:spPr>
-          <a:xfrm>
-            <a:off x="7227360" y="5165280"/>
-            <a:ext cx="2348280" cy="390600"/>
-          </a:xfrm>
-          <a:prstGeom prst="rect">
-            <a:avLst/>
-          </a:prstGeom>
-          <a:noFill/>
-          <a:ln w="0">
-            <a:noFill/>
-          </a:ln>
-        </p:spPr>
-        <p:txBody>
-          <a:bodyPr lIns="0" rIns="0" tIns="0" bIns="0" anchor="t">
-            <a:noAutofit/>
-          </a:bodyPr>
-          <a:lstStyle>
-            <a:lvl1pPr indent="0" algn="r">
-              <a:buNone/>
-              <a:defRPr b="0" lang="en-US" sz="1400" spc="-1" strike="noStrike">
-                <a:solidFill>
-                  <a:srgbClr val="000000"/>
-                </a:solidFill>
-                <a:latin typeface="Times New Roman"/>
-              </a:defRPr>
-            </a:lvl1pPr>
-          </a:lstStyle>
-          <a:p>
-            <a:pPr indent="0" algn="r">
-              <a:buNone/>
-            </a:pPr>
-            <a:fld id="{6490237A-F346-42C1-A69D-61E317D8445F}" type="slidenum">
-              <a:rPr b="0" lang="en-US" sz="1400" spc="-1" strike="noStrike">
-                <a:solidFill>
-                  <a:srgbClr val="000000"/>
-                </a:solidFill>
-                <a:latin typeface="Times New Roman"/>
-              </a:rPr>
-              <a:t>&lt;number&gt;</a:t>
-            </a:fld>
-            <a:endParaRPr b="0" lang="en-US" sz="1400" spc="-1" strike="noStrike">
-              <a:solidFill>
-                <a:srgbClr val="000000"/>
-              </a:solidFill>
-              <a:latin typeface="Times New Roman"/>
             </a:endParaRPr>
           </a:p>
         </p:txBody>
@@ -3043,7 +3065,7 @@
         </p:blipFill>
         <p:spPr>
           <a:xfrm>
-            <a:off x="2134800" y="999720"/>
+            <a:off x="2163240" y="672480"/>
             <a:ext cx="5851800" cy="4388760"/>
           </a:xfrm>
           <a:prstGeom prst="rect">
@@ -3096,7 +3118,7 @@
         </p:blipFill>
         <p:spPr>
           <a:xfrm>
-            <a:off x="2134800" y="999720"/>
+            <a:off x="2163240" y="672480"/>
             <a:ext cx="5851800" cy="4388760"/>
           </a:xfrm>
           <a:prstGeom prst="rect">
@@ -3149,7 +3171,7 @@
         </p:blipFill>
         <p:spPr>
           <a:xfrm>
-            <a:off x="2134800" y="999720"/>
+            <a:off x="2163240" y="669600"/>
             <a:ext cx="5851800" cy="4388760"/>
           </a:xfrm>
           <a:prstGeom prst="rect">
@@ -3190,135 +3212,6 @@
           <a:chExt cx="0" cy="0"/>
         </a:xfrm>
       </p:grpSpPr>
-      <p:pic>
-        <p:nvPicPr>
-          <p:cNvPr id="44" name="" descr=""/>
-          <p:cNvPicPr/>
-          <p:nvPr/>
-        </p:nvPicPr>
-        <p:blipFill>
-          <a:blip r:embed="rId1"/>
-          <a:stretch/>
-        </p:blipFill>
-        <p:spPr>
-          <a:xfrm>
-            <a:off x="2134800" y="999720"/>
-            <a:ext cx="5851800" cy="4388760"/>
-          </a:xfrm>
-          <a:prstGeom prst="rect">
-            <a:avLst/>
-          </a:prstGeom>
-          <a:ln w="0">
-            <a:noFill/>
-          </a:ln>
-        </p:spPr>
-      </p:pic>
-    </p:spTree>
-  </p:cSld>
-  <mc:AlternateContent>
-    <mc:Choice Requires="p14">
-      <p:transition spd="slow" p14:dur="2000"/>
-    </mc:Choice>
-    <mc:Fallback>
-      <p:transition spd="slow"/>
-    </mc:Fallback>
-  </mc:AlternateContent>
-</p:sld>
-</file>
-
-<file path=ppt/slides/slide5.xml><?xml version="1.0" encoding="utf-8"?>
-<p:sld xmlns:a="http://schemas.openxmlformats.org/drawingml/2006/main" xmlns:p="http://schemas.openxmlformats.org/presentationml/2006/main" xmlns:r="http://schemas.openxmlformats.org/officeDocument/2006/relationships" xmlns:p14="http://schemas.microsoft.com/office/powerpoint/2010/main" xmlns:p15="http://schemas.microsoft.com/office/powerpoint/2012/main" xmlns:mc="http://schemas.openxmlformats.org/markup-compatibility/2006">
-  <p:cSld>
-    <p:spTree>
-      <p:nvGrpSpPr>
-        <p:cNvPr id="1" name=""/>
-        <p:cNvGrpSpPr/>
-        <p:nvPr/>
-      </p:nvGrpSpPr>
-      <p:grpSpPr>
-        <a:xfrm>
-          <a:off x="0" y="0"/>
-          <a:ext cx="0" cy="0"/>
-          <a:chOff x="0" y="0"/>
-          <a:chExt cx="0" cy="0"/>
-        </a:xfrm>
-      </p:grpSpPr>
-      <p:pic>
-        <p:nvPicPr>
-          <p:cNvPr id="45" name="" descr=""/>
-          <p:cNvPicPr/>
-          <p:nvPr/>
-        </p:nvPicPr>
-        <p:blipFill>
-          <a:blip r:embed="rId1"/>
-          <a:stretch/>
-        </p:blipFill>
-        <p:spPr>
-          <a:xfrm>
-            <a:off x="2134800" y="999720"/>
-            <a:ext cx="5851800" cy="4388760"/>
-          </a:xfrm>
-          <a:prstGeom prst="rect">
-            <a:avLst/>
-          </a:prstGeom>
-          <a:ln w="0">
-            <a:noFill/>
-          </a:ln>
-        </p:spPr>
-      </p:pic>
-    </p:spTree>
-  </p:cSld>
-  <mc:AlternateContent>
-    <mc:Choice Requires="p14">
-      <p:transition spd="slow" p14:dur="2000"/>
-    </mc:Choice>
-    <mc:Fallback>
-      <p:transition spd="slow"/>
-    </mc:Fallback>
-  </mc:AlternateContent>
-</p:sld>
-</file>
-
-<file path=ppt/slides/slide6.xml><?xml version="1.0" encoding="utf-8"?>
-<p:sld xmlns:a="http://schemas.openxmlformats.org/drawingml/2006/main" xmlns:p="http://schemas.openxmlformats.org/presentationml/2006/main" xmlns:r="http://schemas.openxmlformats.org/officeDocument/2006/relationships" xmlns:p14="http://schemas.microsoft.com/office/powerpoint/2010/main" xmlns:p15="http://schemas.microsoft.com/office/powerpoint/2012/main" xmlns:mc="http://schemas.openxmlformats.org/markup-compatibility/2006">
-  <p:cSld>
-    <p:spTree>
-      <p:nvGrpSpPr>
-        <p:cNvPr id="1" name=""/>
-        <p:cNvGrpSpPr/>
-        <p:nvPr/>
-      </p:nvGrpSpPr>
-      <p:grpSpPr>
-        <a:xfrm>
-          <a:off x="0" y="0"/>
-          <a:ext cx="0" cy="0"/>
-          <a:chOff x="0" y="0"/>
-          <a:chExt cx="0" cy="0"/>
-        </a:xfrm>
-      </p:grpSpPr>
-      <p:pic>
-        <p:nvPicPr>
-          <p:cNvPr id="46" name="" descr=""/>
-          <p:cNvPicPr/>
-          <p:nvPr/>
-        </p:nvPicPr>
-        <p:blipFill>
-          <a:blip r:embed="rId1"/>
-          <a:stretch/>
-        </p:blipFill>
-        <p:spPr>
-          <a:xfrm>
-            <a:off x="2134800" y="999720"/>
-            <a:ext cx="5851800" cy="4388760"/>
-          </a:xfrm>
-          <a:prstGeom prst="rect">
-            <a:avLst/>
-          </a:prstGeom>
-          <a:ln w="0">
-            <a:noFill/>
-          </a:ln>
-        </p:spPr>
-      </p:pic>
     </p:spTree>
   </p:cSld>
   <mc:AlternateContent>
@@ -3337,10 +3230,10 @@
   <a:themeElements>
     <a:clrScheme name="Office">
       <a:dk1>
-        <a:sysClr val="windowText" lastClr="000000"/>
+        <a:srgbClr val="000000"/>
       </a:dk1>
       <a:lt1>
-        <a:sysClr val="window" lastClr="FFFFFF"/>
+        <a:srgbClr val="ffffff"/>
       </a:lt1>
       <a:dk2>
         <a:srgbClr val="1f497d"/>

</xml_diff>